<commit_message>
Update slides, add Async Data Stream slide
</commit_message>
<xml_diff>
--- a/Documentation/ReactiveExtensions.pptx
+++ b/Documentation/ReactiveExtensions.pptx
@@ -5,7 +5,7 @@
     <p:sldMasterId id="2147483684" r:id="rId1"/>
   </p:sldMasterIdLst>
   <p:notesMasterIdLst>
-    <p:notesMasterId r:id="rId16"/>
+    <p:notesMasterId r:id="rId17"/>
   </p:notesMasterIdLst>
   <p:sldIdLst>
     <p:sldId id="256" r:id="rId2"/>
@@ -15,13 +15,14 @@
     <p:sldId id="285" r:id="rId6"/>
     <p:sldId id="286" r:id="rId7"/>
     <p:sldId id="281" r:id="rId8"/>
-    <p:sldId id="279" r:id="rId9"/>
-    <p:sldId id="289" r:id="rId10"/>
-    <p:sldId id="287" r:id="rId11"/>
-    <p:sldId id="283" r:id="rId12"/>
-    <p:sldId id="280" r:id="rId13"/>
-    <p:sldId id="288" r:id="rId14"/>
-    <p:sldId id="290" r:id="rId15"/>
+    <p:sldId id="291" r:id="rId9"/>
+    <p:sldId id="279" r:id="rId10"/>
+    <p:sldId id="289" r:id="rId11"/>
+    <p:sldId id="287" r:id="rId12"/>
+    <p:sldId id="283" r:id="rId13"/>
+    <p:sldId id="280" r:id="rId14"/>
+    <p:sldId id="288" r:id="rId15"/>
+    <p:sldId id="290" r:id="rId16"/>
   </p:sldIdLst>
   <p:sldSz cx="9144000" cy="6858000" type="screen4x3"/>
   <p:notesSz cx="6858000" cy="9144000"/>
@@ -233,7 +234,7 @@
           <a:p>
             <a:fld id="{B8F6BC66-8B75-4550-96EC-757BF0685EF4}" type="datetimeFigureOut">
               <a:rPr lang="en-US" smtClean="0"/>
-              <a:t>3/16/2013</a:t>
+              <a:t>5/1/2013</a:t>
             </a:fld>
             <a:endParaRPr lang="en-US" dirty="0"/>
           </a:p>
@@ -644,7 +645,7 @@
           <a:p>
             <a:fld id="{9744C170-6E19-451C-9C08-D0851A052F9C}" type="datetime1">
               <a:rPr lang="en-US" smtClean="0"/>
-              <a:t>3/16/2013</a:t>
+              <a:t>5/1/2013</a:t>
             </a:fld>
             <a:endParaRPr lang="en-US" dirty="0"/>
           </a:p>
@@ -671,8 +672,12 @@
           <a:lstStyle/>
           <a:p>
             <a:r>
-              <a:rPr lang="nl-NL" smtClean="0"/>
-              <a:t>Aaron D. Hoffman, Hoffman Consulting</a:t>
+              <a:rPr lang="nl-NL" dirty="0" smtClean="0"/>
+              <a:t>Aaron D. Hoffman, </a:t>
+            </a:r>
+            <a:r>
+              <a:rPr lang="nl-NL" dirty="0" smtClean="0"/>
+              <a:t>StoneFinch Consulting</a:t>
             </a:r>
             <a:endParaRPr lang="en-US" dirty="0"/>
           </a:p>
@@ -866,7 +871,7 @@
           <a:p>
             <a:fld id="{B1D3085B-6A63-457B-A87A-1B51D351630D}" type="datetime1">
               <a:rPr lang="en-US" smtClean="0"/>
-              <a:t>3/16/2013</a:t>
+              <a:t>5/1/2013</a:t>
             </a:fld>
             <a:endParaRPr lang="en-US" dirty="0"/>
           </a:p>
@@ -888,8 +893,12 @@
           <a:lstStyle/>
           <a:p>
             <a:r>
-              <a:rPr lang="nl-NL" smtClean="0"/>
-              <a:t>Aaron D. Hoffman, Hoffman Consulting</a:t>
+              <a:rPr lang="nl-NL" dirty="0" smtClean="0"/>
+              <a:t>Aaron D. Hoffman, </a:t>
+            </a:r>
+            <a:r>
+              <a:rPr lang="nl-NL" dirty="0" smtClean="0"/>
+              <a:t>StoneFinch Consulting</a:t>
             </a:r>
             <a:endParaRPr lang="en-US" dirty="0"/>
           </a:p>
@@ -1045,7 +1054,7 @@
           <a:p>
             <a:fld id="{AC1536A8-3FCF-4108-90BC-93430491241D}" type="datetime1">
               <a:rPr lang="en-US" smtClean="0"/>
-              <a:t>3/16/2013</a:t>
+              <a:t>5/1/2013</a:t>
             </a:fld>
             <a:endParaRPr lang="en-US" dirty="0"/>
           </a:p>
@@ -1067,8 +1076,12 @@
           <a:lstStyle/>
           <a:p>
             <a:r>
-              <a:rPr lang="nl-NL" smtClean="0"/>
-              <a:t>Aaron D. Hoffman, Hoffman Consulting</a:t>
+              <a:rPr lang="nl-NL" dirty="0" smtClean="0"/>
+              <a:t>Aaron D. Hoffman, </a:t>
+            </a:r>
+            <a:r>
+              <a:rPr lang="nl-NL" dirty="0" smtClean="0"/>
+              <a:t>StoneFinch Consulting</a:t>
             </a:r>
             <a:endParaRPr lang="en-US" dirty="0"/>
           </a:p>
@@ -1302,7 +1315,7 @@
           <a:p>
             <a:fld id="{7CDB61DF-227E-4C8E-AD9C-594D9D0D9EF2}" type="datetime1">
               <a:rPr lang="en-US" smtClean="0"/>
-              <a:t>3/16/2013</a:t>
+              <a:t>5/1/2013</a:t>
             </a:fld>
             <a:endParaRPr lang="en-US" dirty="0"/>
           </a:p>
@@ -1324,8 +1337,8 @@
           <a:lstStyle/>
           <a:p>
             <a:r>
-              <a:rPr lang="nl-NL" smtClean="0"/>
-              <a:t>Aaron D. Hoffman, Hoffman Consulting</a:t>
+              <a:rPr lang="nl-NL" dirty="0" smtClean="0"/>
+              <a:t>Aaron D. Hoffman, StoneFinch Consulting</a:t>
             </a:r>
             <a:endParaRPr lang="en-US" dirty="0"/>
           </a:p>
@@ -1626,7 +1639,7 @@
           <a:p>
             <a:fld id="{D46AA9D2-0F17-4A91-95AF-C506DD72747F}" type="datetime1">
               <a:rPr lang="en-US" smtClean="0"/>
-              <a:t>3/16/2013</a:t>
+              <a:t>5/1/2013</a:t>
             </a:fld>
             <a:endParaRPr lang="en-US" dirty="0"/>
           </a:p>
@@ -1653,8 +1666,12 @@
           <a:lstStyle/>
           <a:p>
             <a:r>
-              <a:rPr lang="nl-NL" smtClean="0"/>
-              <a:t>Aaron D. Hoffman, Hoffman Consulting</a:t>
+              <a:rPr lang="nl-NL" dirty="0" smtClean="0"/>
+              <a:t>Aaron D. Hoffman, </a:t>
+            </a:r>
+            <a:r>
+              <a:rPr lang="nl-NL" dirty="0" smtClean="0"/>
+              <a:t>StoneFinch Consulting</a:t>
             </a:r>
             <a:endParaRPr lang="en-US" dirty="0"/>
           </a:p>
@@ -1857,7 +1874,7 @@
           <a:p>
             <a:fld id="{7C659C50-077C-4C62-A3A8-B2F6EE360191}" type="datetime1">
               <a:rPr lang="en-US" smtClean="0"/>
-              <a:t>3/16/2013</a:t>
+              <a:t>5/1/2013</a:t>
             </a:fld>
             <a:endParaRPr lang="en-US" dirty="0"/>
           </a:p>
@@ -1879,8 +1896,12 @@
           <a:lstStyle/>
           <a:p>
             <a:r>
-              <a:rPr lang="nl-NL" smtClean="0"/>
-              <a:t>Aaron D. Hoffman, Hoffman Consulting</a:t>
+              <a:rPr lang="nl-NL" dirty="0" smtClean="0"/>
+              <a:t>Aaron D. Hoffman, </a:t>
+            </a:r>
+            <a:r>
+              <a:rPr lang="nl-NL" dirty="0" smtClean="0"/>
+              <a:t>StoneFinch Consulting</a:t>
             </a:r>
             <a:endParaRPr lang="en-US" dirty="0"/>
           </a:p>
@@ -2220,7 +2241,7 @@
           <a:p>
             <a:fld id="{41636A96-80F9-420A-8144-60C12B0BC183}" type="datetime1">
               <a:rPr lang="en-US" smtClean="0"/>
-              <a:t>3/16/2013</a:t>
+              <a:t>5/1/2013</a:t>
             </a:fld>
             <a:endParaRPr lang="en-US" dirty="0"/>
           </a:p>
@@ -2242,8 +2263,12 @@
           <a:lstStyle/>
           <a:p>
             <a:r>
-              <a:rPr lang="nl-NL" smtClean="0"/>
-              <a:t>Aaron D. Hoffman, Hoffman Consulting</a:t>
+              <a:rPr lang="nl-NL" dirty="0" smtClean="0"/>
+              <a:t>Aaron D. Hoffman, </a:t>
+            </a:r>
+            <a:r>
+              <a:rPr lang="nl-NL" dirty="0" smtClean="0"/>
+              <a:t>StoneFinch Consulting</a:t>
             </a:r>
             <a:endParaRPr lang="en-US" dirty="0"/>
           </a:p>
@@ -2463,7 +2488,7 @@
           <a:p>
             <a:fld id="{1554F04E-2CC7-4D68-9EB4-35D5EED29829}" type="datetime1">
               <a:rPr lang="en-US" smtClean="0"/>
-              <a:t>3/16/2013</a:t>
+              <a:t>5/1/2013</a:t>
             </a:fld>
             <a:endParaRPr lang="en-US" dirty="0"/>
           </a:p>
@@ -2485,8 +2510,12 @@
           <a:lstStyle/>
           <a:p>
             <a:r>
-              <a:rPr lang="nl-NL" smtClean="0"/>
-              <a:t>Aaron D. Hoffman, Hoffman Consulting</a:t>
+              <a:rPr lang="nl-NL" dirty="0" smtClean="0"/>
+              <a:t>Aaron D. Hoffman, </a:t>
+            </a:r>
+            <a:r>
+              <a:rPr lang="nl-NL" dirty="0" smtClean="0"/>
+              <a:t>StoneFinch Consulting</a:t>
             </a:r>
             <a:endParaRPr lang="en-US" dirty="0"/>
           </a:p>
@@ -2614,7 +2643,7 @@
           <a:p>
             <a:fld id="{240768EA-A5BA-4AD3-A51D-6C4BBE663257}" type="datetime1">
               <a:rPr lang="en-US" smtClean="0"/>
-              <a:t>3/16/2013</a:t>
+              <a:t>5/1/2013</a:t>
             </a:fld>
             <a:endParaRPr lang="en-US" dirty="0"/>
           </a:p>
@@ -2636,8 +2665,12 @@
           <a:lstStyle/>
           <a:p>
             <a:r>
-              <a:rPr lang="nl-NL" smtClean="0"/>
-              <a:t>Aaron D. Hoffman, Hoffman Consulting</a:t>
+              <a:rPr lang="nl-NL" dirty="0" smtClean="0"/>
+              <a:t>Aaron D. Hoffman, </a:t>
+            </a:r>
+            <a:r>
+              <a:rPr lang="nl-NL" dirty="0" smtClean="0"/>
+              <a:t>StoneFinch Consulting</a:t>
             </a:r>
             <a:endParaRPr lang="en-US" dirty="0"/>
           </a:p>
@@ -2902,7 +2935,7 @@
           <a:p>
             <a:fld id="{329FA63E-F62E-473F-8FD2-9BB0FF679B9F}" type="datetime1">
               <a:rPr lang="en-US" smtClean="0"/>
-              <a:t>3/16/2013</a:t>
+              <a:t>5/1/2013</a:t>
             </a:fld>
             <a:endParaRPr lang="en-US" dirty="0"/>
           </a:p>
@@ -2924,8 +2957,12 @@
           <a:lstStyle/>
           <a:p>
             <a:r>
-              <a:rPr lang="nl-NL" smtClean="0"/>
-              <a:t>Aaron D. Hoffman, Hoffman Consulting</a:t>
+              <a:rPr lang="nl-NL" dirty="0" smtClean="0"/>
+              <a:t>Aaron D. Hoffman, </a:t>
+            </a:r>
+            <a:r>
+              <a:rPr lang="nl-NL" dirty="0" smtClean="0"/>
+              <a:t>StoneFinch Consulting</a:t>
             </a:r>
             <a:endParaRPr lang="en-US" dirty="0"/>
           </a:p>
@@ -3313,7 +3350,7 @@
           <a:p>
             <a:fld id="{F3CE2D69-700F-44BE-B25B-E0AE79FA6B2E}" type="datetime1">
               <a:rPr lang="en-US" smtClean="0"/>
-              <a:t>3/16/2013</a:t>
+              <a:t>5/1/2013</a:t>
             </a:fld>
             <a:endParaRPr lang="en-US" dirty="0"/>
           </a:p>
@@ -3335,8 +3372,12 @@
           <a:lstStyle/>
           <a:p>
             <a:r>
-              <a:rPr lang="nl-NL" smtClean="0"/>
-              <a:t>Aaron D. Hoffman, Hoffman Consulting</a:t>
+              <a:rPr lang="nl-NL" dirty="0" smtClean="0"/>
+              <a:t>Aaron D. Hoffman, </a:t>
+            </a:r>
+            <a:r>
+              <a:rPr lang="nl-NL" dirty="0" smtClean="0"/>
+              <a:t>StoneFinch Consulting</a:t>
             </a:r>
             <a:endParaRPr lang="en-US" dirty="0"/>
           </a:p>
@@ -3661,7 +3702,7 @@
           <a:p>
             <a:fld id="{7A6FFDFA-2FAA-4DBF-8814-7A3E76E30832}" type="datetime1">
               <a:rPr lang="en-US" smtClean="0"/>
-              <a:t>3/16/2013</a:t>
+              <a:t>5/1/2013</a:t>
             </a:fld>
             <a:endParaRPr lang="en-US" dirty="0"/>
           </a:p>
@@ -3702,8 +3743,12 @@
           </a:lstStyle>
           <a:p>
             <a:r>
-              <a:rPr lang="nl-NL" smtClean="0"/>
-              <a:t>Aaron D. Hoffman, Hoffman Consulting</a:t>
+              <a:rPr lang="nl-NL" dirty="0" smtClean="0"/>
+              <a:t>Aaron D. Hoffman, </a:t>
+            </a:r>
+            <a:r>
+              <a:rPr lang="nl-NL" dirty="0" smtClean="0"/>
+              <a:t>StoneFinch Consulting</a:t>
             </a:r>
             <a:endParaRPr lang="en-US" dirty="0"/>
           </a:p>
@@ -4555,8 +4600,12 @@
           <a:lstStyle/>
           <a:p>
             <a:r>
-              <a:rPr lang="nl-NL" smtClean="0"/>
-              <a:t>Aaron D. Hoffman, Hoffman Consulting</a:t>
+              <a:rPr lang="nl-NL" dirty="0" smtClean="0"/>
+              <a:t>Aaron D. Hoffman, </a:t>
+            </a:r>
+            <a:r>
+              <a:rPr lang="nl-NL" dirty="0" smtClean="0"/>
+              <a:t>StoneFinch Consulting</a:t>
             </a:r>
             <a:endParaRPr lang="en-US" dirty="0"/>
           </a:p>
@@ -4600,12 +4649,406 @@
           <a:bodyPr/>
           <a:lstStyle/>
           <a:p>
+            <a:r>
+              <a:rPr lang="en-US" dirty="0" smtClean="0"/>
+              <a:t>Backbone of Rx is </a:t>
+            </a:r>
+            <a:r>
+              <a:rPr lang="en-US" b="1" dirty="0" smtClean="0"/>
+              <a:t>Observable</a:t>
+            </a:r>
+          </a:p>
+          <a:p>
+            <a:pPr lvl="1"/>
+            <a:r>
+              <a:rPr lang="en-US" dirty="0" smtClean="0"/>
+              <a:t>Not “ObservableCollection</a:t>
+            </a:r>
+            <a:r>
+              <a:rPr lang="en-US" dirty="0" smtClean="0"/>
+              <a:t>”</a:t>
+            </a:r>
+            <a:endParaRPr lang="en-US" dirty="0"/>
+          </a:p>
+          <a:p>
+            <a:pPr lvl="1"/>
+            <a:r>
+              <a:rPr lang="en-US" dirty="0"/>
+              <a:t>Async Data Stream = “Future Collection”</a:t>
+            </a:r>
+          </a:p>
+          <a:p>
+            <a:pPr lvl="1"/>
+            <a:r>
+              <a:rPr lang="en-US" dirty="0" smtClean="0"/>
+              <a:t>Almost </a:t>
+            </a:r>
+            <a:r>
+              <a:rPr lang="en-US" dirty="0" smtClean="0"/>
+              <a:t>all data can be expressed in this </a:t>
+            </a:r>
+            <a:r>
+              <a:rPr lang="en-US" dirty="0" smtClean="0"/>
+              <a:t>way</a:t>
+            </a:r>
+          </a:p>
+          <a:p>
+            <a:pPr lvl="1"/>
+            <a:r>
+              <a:rPr lang="en-US" dirty="0" smtClean="0"/>
+              <a:t>Understanding Observable is essential to Rx</a:t>
+            </a:r>
+          </a:p>
+          <a:p>
+            <a:pPr lvl="1"/>
+            <a:endParaRPr lang="en-US" dirty="0"/>
+          </a:p>
+          <a:p>
             <a:pPr marL="274320" lvl="1" indent="0">
               <a:buNone/>
             </a:pPr>
             <a:r>
               <a:rPr lang="en-US" dirty="0" smtClean="0"/>
-              <a:t>Pull - Enumerable 	</a:t>
+              <a:t>  Data Source	     Observable	    Action</a:t>
+            </a:r>
+            <a:endParaRPr lang="en-US" dirty="0"/>
+          </a:p>
+        </p:txBody>
+      </p:sp>
+      <p:sp>
+        <p:nvSpPr>
+          <p:cNvPr id="6" name="Text Placeholder 5"/>
+          <p:cNvSpPr>
+            <a:spLocks noGrp="1"/>
+          </p:cNvSpPr>
+          <p:nvPr>
+            <p:ph type="body" sz="quarter" idx="13"/>
+          </p:nvPr>
+        </p:nvSpPr>
+        <p:spPr/>
+        <p:txBody>
+          <a:bodyPr/>
+          <a:lstStyle/>
+          <a:p>
+            <a:r>
+              <a:rPr lang="en-US" dirty="0"/>
+              <a:t>Reactive Extensions (Rx</a:t>
+            </a:r>
+            <a:r>
+              <a:rPr lang="en-US" dirty="0" smtClean="0"/>
+              <a:t>)</a:t>
+            </a:r>
+            <a:endParaRPr lang="en-US" dirty="0"/>
+          </a:p>
+        </p:txBody>
+      </p:sp>
+      <p:sp>
+        <p:nvSpPr>
+          <p:cNvPr id="7" name="Can 6"/>
+          <p:cNvSpPr/>
+          <p:nvPr/>
+        </p:nvSpPr>
+        <p:spPr>
+          <a:xfrm>
+            <a:off x="1219200" y="4267200"/>
+            <a:ext cx="990600" cy="1143000"/>
+          </a:xfrm>
+          <a:prstGeom prst="can">
+            <a:avLst/>
+          </a:prstGeom>
+        </p:spPr>
+        <p:style>
+          <a:lnRef idx="2">
+            <a:schemeClr val="accent1">
+              <a:shade val="50000"/>
+            </a:schemeClr>
+          </a:lnRef>
+          <a:fillRef idx="1">
+            <a:schemeClr val="accent1"/>
+          </a:fillRef>
+          <a:effectRef idx="0">
+            <a:schemeClr val="accent1"/>
+          </a:effectRef>
+          <a:fontRef idx="minor">
+            <a:schemeClr val="lt1"/>
+          </a:fontRef>
+        </p:style>
+        <p:txBody>
+          <a:bodyPr rtlCol="0" anchor="ctr"/>
+          <a:lstStyle/>
+          <a:p>
+            <a:pPr algn="ctr"/>
+            <a:endParaRPr lang="en-US"/>
+          </a:p>
+        </p:txBody>
+      </p:sp>
+      <p:sp>
+        <p:nvSpPr>
+          <p:cNvPr id="8" name="TextBox 7"/>
+          <p:cNvSpPr txBox="1"/>
+          <p:nvPr/>
+        </p:nvSpPr>
+        <p:spPr>
+          <a:xfrm>
+            <a:off x="3581400" y="4053870"/>
+            <a:ext cx="1676400" cy="1569660"/>
+          </a:xfrm>
+          <a:prstGeom prst="rect">
+            <a:avLst/>
+          </a:prstGeom>
+          <a:noFill/>
+        </p:spPr>
+        <p:txBody>
+          <a:bodyPr wrap="square" rtlCol="0">
+            <a:spAutoFit/>
+          </a:bodyPr>
+          <a:lstStyle/>
+          <a:p>
+            <a:r>
+              <a:rPr lang="en-US" sz="9600" dirty="0" smtClean="0"/>
+              <a:t>Rx</a:t>
+            </a:r>
+            <a:endParaRPr lang="en-US" sz="9600" dirty="0"/>
+          </a:p>
+        </p:txBody>
+      </p:sp>
+      <p:sp>
+        <p:nvSpPr>
+          <p:cNvPr id="9" name="TextBox 8"/>
+          <p:cNvSpPr txBox="1"/>
+          <p:nvPr/>
+        </p:nvSpPr>
+        <p:spPr>
+          <a:xfrm>
+            <a:off x="1447800" y="4217243"/>
+            <a:ext cx="1676400" cy="1446550"/>
+          </a:xfrm>
+          <a:prstGeom prst="rect">
+            <a:avLst/>
+          </a:prstGeom>
+          <a:noFill/>
+        </p:spPr>
+        <p:txBody>
+          <a:bodyPr wrap="square" rtlCol="0">
+            <a:spAutoFit/>
+          </a:bodyPr>
+          <a:lstStyle/>
+          <a:p>
+            <a:r>
+              <a:rPr lang="en-US" sz="8800" dirty="0" smtClean="0"/>
+              <a:t>?</a:t>
+            </a:r>
+            <a:endParaRPr lang="en-US" sz="8800" dirty="0"/>
+          </a:p>
+        </p:txBody>
+      </p:sp>
+      <p:sp>
+        <p:nvSpPr>
+          <p:cNvPr id="10" name="Lightning Bolt 9"/>
+          <p:cNvSpPr/>
+          <p:nvPr/>
+        </p:nvSpPr>
+        <p:spPr>
+          <a:xfrm>
+            <a:off x="6377940" y="4369018"/>
+            <a:ext cx="1219200" cy="1143000"/>
+          </a:xfrm>
+          <a:prstGeom prst="lightningBolt">
+            <a:avLst/>
+          </a:prstGeom>
+        </p:spPr>
+        <p:style>
+          <a:lnRef idx="2">
+            <a:schemeClr val="accent1">
+              <a:shade val="50000"/>
+            </a:schemeClr>
+          </a:lnRef>
+          <a:fillRef idx="1">
+            <a:schemeClr val="accent1"/>
+          </a:fillRef>
+          <a:effectRef idx="0">
+            <a:schemeClr val="accent1"/>
+          </a:effectRef>
+          <a:fontRef idx="minor">
+            <a:schemeClr val="lt1"/>
+          </a:fontRef>
+        </p:style>
+        <p:txBody>
+          <a:bodyPr rtlCol="0" anchor="ctr"/>
+          <a:lstStyle/>
+          <a:p>
+            <a:pPr algn="ctr"/>
+            <a:endParaRPr lang="en-US"/>
+          </a:p>
+        </p:txBody>
+      </p:sp>
+      <p:sp>
+        <p:nvSpPr>
+          <p:cNvPr id="11" name="TextBox 10"/>
+          <p:cNvSpPr txBox="1"/>
+          <p:nvPr/>
+        </p:nvSpPr>
+        <p:spPr>
+          <a:xfrm>
+            <a:off x="2480154" y="5638800"/>
+            <a:ext cx="4002378" cy="400110"/>
+          </a:xfrm>
+          <a:prstGeom prst="rect">
+            <a:avLst/>
+          </a:prstGeom>
+          <a:noFill/>
+        </p:spPr>
+        <p:txBody>
+          <a:bodyPr wrap="none" rtlCol="0">
+            <a:spAutoFit/>
+          </a:bodyPr>
+          <a:lstStyle/>
+          <a:p>
+            <a:r>
+              <a:rPr lang="en-US" sz="2000" i="1" dirty="0" smtClean="0"/>
+              <a:t>Standardize the “glue” (similar to LINQ)</a:t>
+            </a:r>
+            <a:endParaRPr lang="en-US" sz="2000" i="1" dirty="0"/>
+          </a:p>
+        </p:txBody>
+      </p:sp>
+    </p:spTree>
+    <p:extLst>
+      <p:ext uri="{BB962C8B-B14F-4D97-AF65-F5344CB8AC3E}">
+        <p14:creationId xmlns:p14="http://schemas.microsoft.com/office/powerpoint/2010/main" val="3527076642"/>
+      </p:ext>
+    </p:extLst>
+  </p:cSld>
+  <p:clrMapOvr>
+    <a:masterClrMapping/>
+  </p:clrMapOvr>
+  <p:timing>
+    <p:tnLst>
+      <p:par>
+        <p:cTn id="1" dur="indefinite" restart="never" nodeType="tmRoot"/>
+      </p:par>
+    </p:tnLst>
+  </p:timing>
+</p:sld>
+</file>
+
+<file path=ppt/slides/slide11.xml><?xml version="1.0" encoding="utf-8"?>
+<p:sld xmlns:a="http://schemas.openxmlformats.org/drawingml/2006/main" xmlns:r="http://schemas.openxmlformats.org/officeDocument/2006/relationships" xmlns:p="http://schemas.openxmlformats.org/presentationml/2006/main">
+  <p:cSld>
+    <p:spTree>
+      <p:nvGrpSpPr>
+        <p:cNvPr id="1" name=""/>
+        <p:cNvGrpSpPr/>
+        <p:nvPr/>
+      </p:nvGrpSpPr>
+      <p:grpSpPr>
+        <a:xfrm>
+          <a:off x="0" y="0"/>
+          <a:ext cx="0" cy="0"/>
+          <a:chOff x="0" y="0"/>
+          <a:chExt cx="0" cy="0"/>
+        </a:xfrm>
+      </p:grpSpPr>
+      <p:sp>
+        <p:nvSpPr>
+          <p:cNvPr id="2" name="Title 1"/>
+          <p:cNvSpPr>
+            <a:spLocks noGrp="1"/>
+          </p:cNvSpPr>
+          <p:nvPr>
+            <p:ph type="title"/>
+          </p:nvPr>
+        </p:nvSpPr>
+        <p:spPr/>
+        <p:txBody>
+          <a:bodyPr>
+            <a:normAutofit/>
+          </a:bodyPr>
+          <a:lstStyle/>
+          <a:p>
+            <a:r>
+              <a:rPr lang="en-US" dirty="0" smtClean="0"/>
+              <a:t>Rx Overview</a:t>
+            </a:r>
+            <a:endParaRPr lang="en-US" dirty="0"/>
+          </a:p>
+        </p:txBody>
+      </p:sp>
+      <p:sp>
+        <p:nvSpPr>
+          <p:cNvPr id="3" name="Footer Placeholder 2"/>
+          <p:cNvSpPr>
+            <a:spLocks noGrp="1"/>
+          </p:cNvSpPr>
+          <p:nvPr>
+            <p:ph type="ftr" sz="quarter" idx="11"/>
+          </p:nvPr>
+        </p:nvSpPr>
+        <p:spPr/>
+        <p:txBody>
+          <a:bodyPr/>
+          <a:lstStyle/>
+          <a:p>
+            <a:r>
+              <a:rPr lang="nl-NL" dirty="0" smtClean="0"/>
+              <a:t>Aaron D. Hoffman, </a:t>
+            </a:r>
+            <a:r>
+              <a:rPr lang="nl-NL" dirty="0" smtClean="0"/>
+              <a:t>StoneFinch Consulting</a:t>
+            </a:r>
+            <a:endParaRPr lang="en-US" dirty="0"/>
+          </a:p>
+        </p:txBody>
+      </p:sp>
+      <p:sp>
+        <p:nvSpPr>
+          <p:cNvPr id="4" name="Slide Number Placeholder 3"/>
+          <p:cNvSpPr>
+            <a:spLocks noGrp="1"/>
+          </p:cNvSpPr>
+          <p:nvPr>
+            <p:ph type="sldNum" sz="quarter" idx="12"/>
+          </p:nvPr>
+        </p:nvSpPr>
+        <p:spPr/>
+        <p:txBody>
+          <a:bodyPr/>
+          <a:lstStyle/>
+          <a:p>
+            <a:fld id="{C0F0A909-BB68-4F26-B2F3-67B52DDC82E8}" type="slidenum">
+              <a:rPr lang="en-US" smtClean="0"/>
+              <a:t>11</a:t>
+            </a:fld>
+            <a:endParaRPr lang="en-US" dirty="0"/>
+          </a:p>
+        </p:txBody>
+      </p:sp>
+      <p:sp>
+        <p:nvSpPr>
+          <p:cNvPr id="5" name="Content Placeholder 4"/>
+          <p:cNvSpPr>
+            <a:spLocks noGrp="1"/>
+          </p:cNvSpPr>
+          <p:nvPr>
+            <p:ph sz="quarter" idx="1"/>
+          </p:nvPr>
+        </p:nvSpPr>
+        <p:spPr/>
+        <p:txBody>
+          <a:bodyPr/>
+          <a:lstStyle/>
+          <a:p>
+            <a:pPr marL="274320" lvl="1" indent="0">
+              <a:buNone/>
+            </a:pPr>
+            <a:r>
+              <a:rPr lang="en-US" dirty="0" smtClean="0"/>
+              <a:t>Enumerable - Pull </a:t>
+            </a:r>
+            <a:r>
+              <a:rPr lang="en-US" dirty="0" smtClean="0"/>
+              <a:t>	</a:t>
             </a:r>
             <a:r>
               <a:rPr lang="en-US" dirty="0"/>
@@ -4613,8 +5056,13 @@
             </a:r>
             <a:r>
               <a:rPr lang="en-US" dirty="0" smtClean="0"/>
-              <a:t>	    Push - Observables </a:t>
-            </a:r>
+              <a:t>	    </a:t>
+            </a:r>
+            <a:r>
+              <a:rPr lang="en-US" dirty="0" smtClean="0"/>
+              <a:t>Observable - Push</a:t>
+            </a:r>
+            <a:endParaRPr lang="en-US" dirty="0" smtClean="0"/>
           </a:p>
           <a:p>
             <a:pPr marL="274320" lvl="1" indent="0">
@@ -4807,7 +5255,7 @@
 </p:sld>
 </file>
 
-<file path=ppt/slides/slide11.xml><?xml version="1.0" encoding="utf-8"?>
+<file path=ppt/slides/slide12.xml><?xml version="1.0" encoding="utf-8"?>
 <p:sld xmlns:a="http://schemas.openxmlformats.org/drawingml/2006/main" xmlns:r="http://schemas.openxmlformats.org/officeDocument/2006/relationships" xmlns:p="http://schemas.openxmlformats.org/presentationml/2006/main">
   <p:cSld>
     <p:spTree>
@@ -4865,8 +5313,12 @@
           <a:lstStyle/>
           <a:p>
             <a:r>
-              <a:rPr lang="nl-NL" smtClean="0"/>
-              <a:t>Aaron D. Hoffman, Hoffman Consulting</a:t>
+              <a:rPr lang="nl-NL" dirty="0" smtClean="0"/>
+              <a:t>Aaron D. Hoffman, </a:t>
+            </a:r>
+            <a:r>
+              <a:rPr lang="nl-NL" dirty="0" smtClean="0"/>
+              <a:t>StoneFinch Consulting</a:t>
             </a:r>
             <a:endParaRPr lang="en-US" dirty="0"/>
           </a:p>
@@ -4889,7 +5341,7 @@
           <a:p>
             <a:fld id="{C0F0A909-BB68-4F26-B2F3-67B52DDC82E8}" type="slidenum">
               <a:rPr lang="en-US" smtClean="0"/>
-              <a:t>11</a:t>
+              <a:t>12</a:t>
             </a:fld>
             <a:endParaRPr lang="en-US" dirty="0"/>
           </a:p>
@@ -4911,12 +5363,8 @@
           <a:lstStyle/>
           <a:p>
             <a:r>
-              <a:rPr lang="en-US" dirty="0" err="1" smtClean="0"/>
-              <a:t>System.Reactive</a:t>
-            </a:r>
-            <a:r>
-              <a:rPr lang="en-US" dirty="0" smtClean="0"/>
-              <a:t> namespace</a:t>
+              <a:rPr lang="en-US" dirty="0" smtClean="0"/>
+              <a:t>System.Reactive namespace</a:t>
             </a:r>
           </a:p>
           <a:p>
@@ -5019,215 +5467,6 @@
 </p:sld>
 </file>
 
-<file path=ppt/slides/slide12.xml><?xml version="1.0" encoding="utf-8"?>
-<p:sld xmlns:a="http://schemas.openxmlformats.org/drawingml/2006/main" xmlns:r="http://schemas.openxmlformats.org/officeDocument/2006/relationships" xmlns:p="http://schemas.openxmlformats.org/presentationml/2006/main">
-  <p:cSld>
-    <p:spTree>
-      <p:nvGrpSpPr>
-        <p:cNvPr id="1" name=""/>
-        <p:cNvGrpSpPr/>
-        <p:nvPr/>
-      </p:nvGrpSpPr>
-      <p:grpSpPr>
-        <a:xfrm>
-          <a:off x="0" y="0"/>
-          <a:ext cx="0" cy="0"/>
-          <a:chOff x="0" y="0"/>
-          <a:chExt cx="0" cy="0"/>
-        </a:xfrm>
-      </p:grpSpPr>
-      <p:sp>
-        <p:nvSpPr>
-          <p:cNvPr id="2" name="Title 1"/>
-          <p:cNvSpPr>
-            <a:spLocks noGrp="1"/>
-          </p:cNvSpPr>
-          <p:nvPr>
-            <p:ph type="title"/>
-          </p:nvPr>
-        </p:nvSpPr>
-        <p:spPr/>
-        <p:txBody>
-          <a:bodyPr>
-            <a:normAutofit/>
-          </a:bodyPr>
-          <a:lstStyle/>
-          <a:p>
-            <a:r>
-              <a:rPr lang="en-US" dirty="0" smtClean="0"/>
-              <a:t>Rx Overview</a:t>
-            </a:r>
-            <a:endParaRPr lang="en-US" dirty="0"/>
-          </a:p>
-        </p:txBody>
-      </p:sp>
-      <p:sp>
-        <p:nvSpPr>
-          <p:cNvPr id="3" name="Footer Placeholder 2"/>
-          <p:cNvSpPr>
-            <a:spLocks noGrp="1"/>
-          </p:cNvSpPr>
-          <p:nvPr>
-            <p:ph type="ftr" sz="quarter" idx="11"/>
-          </p:nvPr>
-        </p:nvSpPr>
-        <p:spPr/>
-        <p:txBody>
-          <a:bodyPr/>
-          <a:lstStyle/>
-          <a:p>
-            <a:r>
-              <a:rPr lang="nl-NL" smtClean="0"/>
-              <a:t>Aaron D. Hoffman, Hoffman Consulting</a:t>
-            </a:r>
-            <a:endParaRPr lang="en-US" dirty="0"/>
-          </a:p>
-        </p:txBody>
-      </p:sp>
-      <p:sp>
-        <p:nvSpPr>
-          <p:cNvPr id="4" name="Slide Number Placeholder 3"/>
-          <p:cNvSpPr>
-            <a:spLocks noGrp="1"/>
-          </p:cNvSpPr>
-          <p:nvPr>
-            <p:ph type="sldNum" sz="quarter" idx="12"/>
-          </p:nvPr>
-        </p:nvSpPr>
-        <p:spPr/>
-        <p:txBody>
-          <a:bodyPr/>
-          <a:lstStyle/>
-          <a:p>
-            <a:fld id="{C0F0A909-BB68-4F26-B2F3-67B52DDC82E8}" type="slidenum">
-              <a:rPr lang="en-US" smtClean="0"/>
-              <a:t>12</a:t>
-            </a:fld>
-            <a:endParaRPr lang="en-US" dirty="0"/>
-          </a:p>
-        </p:txBody>
-      </p:sp>
-      <p:sp>
-        <p:nvSpPr>
-          <p:cNvPr id="5" name="Content Placeholder 4"/>
-          <p:cNvSpPr>
-            <a:spLocks noGrp="1"/>
-          </p:cNvSpPr>
-          <p:nvPr>
-            <p:ph sz="quarter" idx="1"/>
-          </p:nvPr>
-        </p:nvSpPr>
-        <p:spPr/>
-        <p:txBody>
-          <a:bodyPr/>
-          <a:lstStyle/>
-          <a:p>
-            <a:endParaRPr lang="en-US" dirty="0" smtClean="0"/>
-          </a:p>
-          <a:p>
-            <a:r>
-              <a:rPr lang="en-US" dirty="0" smtClean="0"/>
-              <a:t>Release History</a:t>
-            </a:r>
-          </a:p>
-          <a:p>
-            <a:pPr marL="0" indent="0">
-              <a:buNone/>
-            </a:pPr>
-            <a:endParaRPr lang="en-US" dirty="0" smtClean="0"/>
-          </a:p>
-          <a:p>
-            <a:pPr lvl="1"/>
-            <a:r>
-              <a:rPr lang="en-US" dirty="0"/>
-              <a:t>Version 1.0 </a:t>
-            </a:r>
-            <a:r>
-              <a:rPr lang="en-US" dirty="0" smtClean="0"/>
-              <a:t>		November 2009</a:t>
-            </a:r>
-          </a:p>
-          <a:p>
-            <a:pPr lvl="1"/>
-            <a:r>
-              <a:rPr lang="en-US" dirty="0" smtClean="0"/>
-              <a:t>Version 1.1 		June 2011</a:t>
-            </a:r>
-          </a:p>
-          <a:p>
-            <a:pPr lvl="1"/>
-            <a:r>
-              <a:rPr lang="en-US" dirty="0" smtClean="0"/>
-              <a:t>Version 2.0		August 2012</a:t>
-            </a:r>
-          </a:p>
-          <a:p>
-            <a:pPr lvl="1"/>
-            <a:r>
-              <a:rPr lang="en-US" dirty="0" smtClean="0"/>
-              <a:t>Open Sourced		November 2012</a:t>
-            </a:r>
-          </a:p>
-          <a:p>
-            <a:pPr lvl="1"/>
-            <a:r>
-              <a:rPr lang="en-US" dirty="0" smtClean="0"/>
-              <a:t>Version 2.1		February 2013</a:t>
-            </a:r>
-            <a:endParaRPr lang="en-US" dirty="0"/>
-          </a:p>
-          <a:p>
-            <a:endParaRPr lang="en-US" dirty="0"/>
-          </a:p>
-        </p:txBody>
-      </p:sp>
-      <p:sp>
-        <p:nvSpPr>
-          <p:cNvPr id="6" name="Text Placeholder 5"/>
-          <p:cNvSpPr>
-            <a:spLocks noGrp="1"/>
-          </p:cNvSpPr>
-          <p:nvPr>
-            <p:ph type="body" sz="quarter" idx="13"/>
-          </p:nvPr>
-        </p:nvSpPr>
-        <p:spPr/>
-        <p:txBody>
-          <a:bodyPr/>
-          <a:lstStyle/>
-          <a:p>
-            <a:r>
-              <a:rPr lang="en-US" dirty="0"/>
-              <a:t>Reactive Extensions (Rx</a:t>
-            </a:r>
-            <a:r>
-              <a:rPr lang="en-US" dirty="0" smtClean="0"/>
-              <a:t>)</a:t>
-            </a:r>
-            <a:endParaRPr lang="en-US" dirty="0"/>
-          </a:p>
-        </p:txBody>
-      </p:sp>
-    </p:spTree>
-    <p:extLst>
-      <p:ext uri="{BB962C8B-B14F-4D97-AF65-F5344CB8AC3E}">
-        <p14:creationId xmlns:p14="http://schemas.microsoft.com/office/powerpoint/2010/main" val="2060112904"/>
-      </p:ext>
-    </p:extLst>
-  </p:cSld>
-  <p:clrMapOvr>
-    <a:masterClrMapping/>
-  </p:clrMapOvr>
-  <p:timing>
-    <p:tnLst>
-      <p:par>
-        <p:cTn id="1" dur="indefinite" restart="never" nodeType="tmRoot"/>
-      </p:par>
-    </p:tnLst>
-  </p:timing>
-</p:sld>
-</file>
-
 <file path=ppt/slides/slide13.xml><?xml version="1.0" encoding="utf-8"?>
 <p:sld xmlns:a="http://schemas.openxmlformats.org/drawingml/2006/main" xmlns:r="http://schemas.openxmlformats.org/officeDocument/2006/relationships" xmlns:p="http://schemas.openxmlformats.org/presentationml/2006/main">
   <p:cSld>
@@ -5286,8 +5525,12 @@
           <a:lstStyle/>
           <a:p>
             <a:r>
-              <a:rPr lang="nl-NL" smtClean="0"/>
-              <a:t>Aaron D. Hoffman, Hoffman Consulting</a:t>
+              <a:rPr lang="nl-NL" dirty="0" smtClean="0"/>
+              <a:t>Aaron D. Hoffman, </a:t>
+            </a:r>
+            <a:r>
+              <a:rPr lang="nl-NL" dirty="0" smtClean="0"/>
+              <a:t>StoneFinch Consulting</a:t>
             </a:r>
             <a:endParaRPr lang="en-US" dirty="0"/>
           </a:p>
@@ -5334,19 +5577,9 @@
             <a:endParaRPr lang="en-US" dirty="0" smtClean="0"/>
           </a:p>
           <a:p>
-            <a:endParaRPr lang="en-US" dirty="0"/>
-          </a:p>
-          <a:p>
-            <a:pPr marL="0" indent="0">
-              <a:buNone/>
-            </a:pPr>
-            <a:r>
-              <a:rPr lang="en-US" dirty="0"/>
-              <a:t>	</a:t>
-            </a:r>
-            <a:r>
-              <a:rPr lang="en-US" dirty="0" smtClean="0"/>
-              <a:t>Examples</a:t>
+            <a:r>
+              <a:rPr lang="en-US" dirty="0" smtClean="0"/>
+              <a:t>Release History</a:t>
             </a:r>
           </a:p>
           <a:p>
@@ -5356,27 +5589,46 @@
             <a:endParaRPr lang="en-US" dirty="0" smtClean="0"/>
           </a:p>
           <a:p>
-            <a:pPr marL="0" indent="0">
-              <a:buNone/>
-            </a:pPr>
-            <a:endParaRPr lang="en-US" dirty="0"/>
-          </a:p>
-          <a:p>
-            <a:pPr marL="0" indent="0">
-              <a:buNone/>
-            </a:pPr>
-            <a:r>
-              <a:rPr lang="en-US" dirty="0" smtClean="0"/>
-              <a:t>	Questions?  Just speak </a:t>
-            </a:r>
+            <a:pPr lvl="1"/>
             <a:r>
               <a:rPr lang="en-US" dirty="0"/>
-              <a:t>u</a:t>
-            </a:r>
-            <a:r>
-              <a:rPr lang="en-US" dirty="0" smtClean="0"/>
-              <a:t>p</a:t>
-            </a:r>
+              <a:t>Version 1.0 </a:t>
+            </a:r>
+            <a:r>
+              <a:rPr lang="en-US" dirty="0" smtClean="0"/>
+              <a:t>		November 2009</a:t>
+            </a:r>
+          </a:p>
+          <a:p>
+            <a:pPr lvl="1"/>
+            <a:r>
+              <a:rPr lang="en-US" dirty="0" smtClean="0"/>
+              <a:t>Version 1.1 		June 2011</a:t>
+            </a:r>
+          </a:p>
+          <a:p>
+            <a:pPr lvl="1"/>
+            <a:r>
+              <a:rPr lang="en-US" dirty="0" smtClean="0"/>
+              <a:t>Version 2.0		August 2012</a:t>
+            </a:r>
+          </a:p>
+          <a:p>
+            <a:pPr lvl="1"/>
+            <a:r>
+              <a:rPr lang="en-US" dirty="0" smtClean="0"/>
+              <a:t>Open Sourced		November 2012</a:t>
+            </a:r>
+          </a:p>
+          <a:p>
+            <a:pPr lvl="1"/>
+            <a:r>
+              <a:rPr lang="en-US" dirty="0" smtClean="0"/>
+              <a:t>Version 2.1		February 2013</a:t>
+            </a:r>
+            <a:endParaRPr lang="en-US" dirty="0"/>
+          </a:p>
+          <a:p>
             <a:endParaRPr lang="en-US" dirty="0"/>
           </a:p>
         </p:txBody>
@@ -5411,7 +5663,7 @@
     </p:spTree>
     <p:extLst>
       <p:ext uri="{BB962C8B-B14F-4D97-AF65-F5344CB8AC3E}">
-        <p14:creationId xmlns:p14="http://schemas.microsoft.com/office/powerpoint/2010/main" val="1959692351"/>
+        <p14:creationId xmlns:p14="http://schemas.microsoft.com/office/powerpoint/2010/main" val="2060112904"/>
       </p:ext>
     </p:extLst>
   </p:cSld>
@@ -5457,12 +5709,14 @@
         </p:nvSpPr>
         <p:spPr/>
         <p:txBody>
-          <a:bodyPr/>
-          <a:lstStyle/>
-          <a:p>
-            <a:r>
-              <a:rPr lang="en-US" dirty="0" smtClean="0"/>
-              <a:t>Conclusion</a:t>
+          <a:bodyPr>
+            <a:normAutofit/>
+          </a:bodyPr>
+          <a:lstStyle/>
+          <a:p>
+            <a:r>
+              <a:rPr lang="en-US" dirty="0" smtClean="0"/>
+              <a:t>Rx Overview</a:t>
             </a:r>
             <a:endParaRPr lang="en-US" dirty="0"/>
           </a:p>
@@ -5484,8 +5738,12 @@
           <a:lstStyle/>
           <a:p>
             <a:r>
-              <a:rPr lang="nl-NL" smtClean="0"/>
-              <a:t>Aaron D. Hoffman, Hoffman Consulting</a:t>
+              <a:rPr lang="nl-NL" dirty="0" smtClean="0"/>
+              <a:t>Aaron D. Hoffman, </a:t>
+            </a:r>
+            <a:r>
+              <a:rPr lang="nl-NL" dirty="0" smtClean="0"/>
+              <a:t>StoneFinch Consulting</a:t>
             </a:r>
             <a:endParaRPr lang="en-US" dirty="0"/>
           </a:p>
@@ -5509,6 +5767,208 @@
             <a:fld id="{C0F0A909-BB68-4F26-B2F3-67B52DDC82E8}" type="slidenum">
               <a:rPr lang="en-US" smtClean="0"/>
               <a:t>14</a:t>
+            </a:fld>
+            <a:endParaRPr lang="en-US" dirty="0"/>
+          </a:p>
+        </p:txBody>
+      </p:sp>
+      <p:sp>
+        <p:nvSpPr>
+          <p:cNvPr id="5" name="Content Placeholder 4"/>
+          <p:cNvSpPr>
+            <a:spLocks noGrp="1"/>
+          </p:cNvSpPr>
+          <p:nvPr>
+            <p:ph sz="quarter" idx="1"/>
+          </p:nvPr>
+        </p:nvSpPr>
+        <p:spPr/>
+        <p:txBody>
+          <a:bodyPr/>
+          <a:lstStyle/>
+          <a:p>
+            <a:endParaRPr lang="en-US" dirty="0" smtClean="0"/>
+          </a:p>
+          <a:p>
+            <a:endParaRPr lang="en-US" dirty="0"/>
+          </a:p>
+          <a:p>
+            <a:pPr marL="0" indent="0">
+              <a:buNone/>
+            </a:pPr>
+            <a:r>
+              <a:rPr lang="en-US" dirty="0"/>
+              <a:t>	</a:t>
+            </a:r>
+            <a:r>
+              <a:rPr lang="en-US" dirty="0" smtClean="0"/>
+              <a:t>Examples</a:t>
+            </a:r>
+          </a:p>
+          <a:p>
+            <a:pPr marL="0" indent="0">
+              <a:buNone/>
+            </a:pPr>
+            <a:endParaRPr lang="en-US" dirty="0" smtClean="0"/>
+          </a:p>
+          <a:p>
+            <a:pPr marL="0" indent="0">
+              <a:buNone/>
+            </a:pPr>
+            <a:endParaRPr lang="en-US" dirty="0"/>
+          </a:p>
+          <a:p>
+            <a:pPr marL="0" indent="0">
+              <a:buNone/>
+            </a:pPr>
+            <a:r>
+              <a:rPr lang="en-US" dirty="0" smtClean="0"/>
+              <a:t>	Questions?  Just speak </a:t>
+            </a:r>
+            <a:r>
+              <a:rPr lang="en-US" dirty="0"/>
+              <a:t>u</a:t>
+            </a:r>
+            <a:r>
+              <a:rPr lang="en-US" dirty="0" smtClean="0"/>
+              <a:t>p</a:t>
+            </a:r>
+            <a:endParaRPr lang="en-US" dirty="0"/>
+          </a:p>
+        </p:txBody>
+      </p:sp>
+      <p:sp>
+        <p:nvSpPr>
+          <p:cNvPr id="6" name="Text Placeholder 5"/>
+          <p:cNvSpPr>
+            <a:spLocks noGrp="1"/>
+          </p:cNvSpPr>
+          <p:nvPr>
+            <p:ph type="body" sz="quarter" idx="13"/>
+          </p:nvPr>
+        </p:nvSpPr>
+        <p:spPr/>
+        <p:txBody>
+          <a:bodyPr/>
+          <a:lstStyle/>
+          <a:p>
+            <a:r>
+              <a:rPr lang="en-US" dirty="0"/>
+              <a:t>Reactive Extensions (Rx</a:t>
+            </a:r>
+            <a:r>
+              <a:rPr lang="en-US" dirty="0" smtClean="0"/>
+              <a:t>)</a:t>
+            </a:r>
+            <a:endParaRPr lang="en-US" dirty="0"/>
+          </a:p>
+        </p:txBody>
+      </p:sp>
+    </p:spTree>
+    <p:extLst>
+      <p:ext uri="{BB962C8B-B14F-4D97-AF65-F5344CB8AC3E}">
+        <p14:creationId xmlns:p14="http://schemas.microsoft.com/office/powerpoint/2010/main" val="1959692351"/>
+      </p:ext>
+    </p:extLst>
+  </p:cSld>
+  <p:clrMapOvr>
+    <a:masterClrMapping/>
+  </p:clrMapOvr>
+  <p:timing>
+    <p:tnLst>
+      <p:par>
+        <p:cTn id="1" dur="indefinite" restart="never" nodeType="tmRoot"/>
+      </p:par>
+    </p:tnLst>
+  </p:timing>
+</p:sld>
+</file>
+
+<file path=ppt/slides/slide15.xml><?xml version="1.0" encoding="utf-8"?>
+<p:sld xmlns:a="http://schemas.openxmlformats.org/drawingml/2006/main" xmlns:r="http://schemas.openxmlformats.org/officeDocument/2006/relationships" xmlns:p="http://schemas.openxmlformats.org/presentationml/2006/main">
+  <p:cSld>
+    <p:spTree>
+      <p:nvGrpSpPr>
+        <p:cNvPr id="1" name=""/>
+        <p:cNvGrpSpPr/>
+        <p:nvPr/>
+      </p:nvGrpSpPr>
+      <p:grpSpPr>
+        <a:xfrm>
+          <a:off x="0" y="0"/>
+          <a:ext cx="0" cy="0"/>
+          <a:chOff x="0" y="0"/>
+          <a:chExt cx="0" cy="0"/>
+        </a:xfrm>
+      </p:grpSpPr>
+      <p:sp>
+        <p:nvSpPr>
+          <p:cNvPr id="2" name="Title 1"/>
+          <p:cNvSpPr>
+            <a:spLocks noGrp="1"/>
+          </p:cNvSpPr>
+          <p:nvPr>
+            <p:ph type="title"/>
+          </p:nvPr>
+        </p:nvSpPr>
+        <p:spPr/>
+        <p:txBody>
+          <a:bodyPr/>
+          <a:lstStyle/>
+          <a:p>
+            <a:r>
+              <a:rPr lang="en-US" dirty="0" smtClean="0"/>
+              <a:t>Conclusion</a:t>
+            </a:r>
+            <a:endParaRPr lang="en-US" dirty="0"/>
+          </a:p>
+        </p:txBody>
+      </p:sp>
+      <p:sp>
+        <p:nvSpPr>
+          <p:cNvPr id="3" name="Footer Placeholder 2"/>
+          <p:cNvSpPr>
+            <a:spLocks noGrp="1"/>
+          </p:cNvSpPr>
+          <p:nvPr>
+            <p:ph type="ftr" sz="quarter" idx="11"/>
+          </p:nvPr>
+        </p:nvSpPr>
+        <p:spPr/>
+        <p:txBody>
+          <a:bodyPr/>
+          <a:lstStyle/>
+          <a:p>
+            <a:r>
+              <a:rPr lang="nl-NL" dirty="0" smtClean="0"/>
+              <a:t>Aaron D. Hoffman, </a:t>
+            </a:r>
+            <a:r>
+              <a:rPr lang="nl-NL" dirty="0" smtClean="0"/>
+              <a:t>StoneFinch Consulting</a:t>
+            </a:r>
+            <a:endParaRPr lang="en-US" dirty="0"/>
+          </a:p>
+        </p:txBody>
+      </p:sp>
+      <p:sp>
+        <p:nvSpPr>
+          <p:cNvPr id="4" name="Slide Number Placeholder 3"/>
+          <p:cNvSpPr>
+            <a:spLocks noGrp="1"/>
+          </p:cNvSpPr>
+          <p:nvPr>
+            <p:ph type="sldNum" sz="quarter" idx="12"/>
+          </p:nvPr>
+        </p:nvSpPr>
+        <p:spPr/>
+        <p:txBody>
+          <a:bodyPr/>
+          <a:lstStyle/>
+          <a:p>
+            <a:fld id="{C0F0A909-BB68-4F26-B2F3-67B52DDC82E8}" type="slidenum">
+              <a:rPr lang="en-US" smtClean="0"/>
+              <a:t>15</a:t>
             </a:fld>
             <a:endParaRPr lang="en-US" dirty="0"/>
           </a:p>
@@ -5873,7 +6333,11 @@
           <a:p>
             <a:r>
               <a:rPr lang="nl-NL" dirty="0" smtClean="0"/>
-              <a:t>Aaron D. Hoffman, Hoffman Consulting</a:t>
+              <a:t>Aaron D. Hoffman, </a:t>
+            </a:r>
+            <a:r>
+              <a:rPr lang="nl-NL" dirty="0" smtClean="0"/>
+              <a:t>StoneFinch Consulting</a:t>
             </a:r>
             <a:endParaRPr lang="en-US" dirty="0"/>
           </a:p>
@@ -5938,19 +6402,21 @@
           <a:p>
             <a:r>
               <a:rPr lang="en-US" dirty="0" smtClean="0"/>
-              <a:t>Independent </a:t>
-            </a:r>
+              <a:t>Consultant at StoneFinch</a:t>
+            </a:r>
+            <a:endParaRPr lang="en-US" dirty="0"/>
+          </a:p>
+          <a:p>
+            <a:pPr lvl="1"/>
             <a:r>
               <a:rPr lang="en-US" dirty="0"/>
-              <a:t>IT Consultant</a:t>
-            </a:r>
-          </a:p>
-          <a:p>
-            <a:pPr lvl="1"/>
-            <a:r>
-              <a:rPr lang="en-US" dirty="0"/>
-              <a:t>Agile Development</a:t>
-            </a:r>
+              <a:t>Agile </a:t>
+            </a:r>
+            <a:r>
+              <a:rPr lang="en-US" dirty="0" smtClean="0"/>
+              <a:t>Development, Data Analytics</a:t>
+            </a:r>
+            <a:endParaRPr lang="en-US" dirty="0"/>
           </a:p>
           <a:p>
             <a:pPr lvl="1"/>
@@ -6127,7 +6593,11 @@
           <a:p>
             <a:r>
               <a:rPr lang="nl-NL" dirty="0" smtClean="0"/>
-              <a:t>Aaron D. Hoffman, Hoffman Consulting</a:t>
+              <a:t>Aaron D. Hoffman, </a:t>
+            </a:r>
+            <a:r>
+              <a:rPr lang="nl-NL" dirty="0" smtClean="0"/>
+              <a:t>StoneFinch Consulting</a:t>
             </a:r>
             <a:endParaRPr lang="en-US" dirty="0"/>
           </a:p>
@@ -6229,11 +6699,7 @@
             <a:pPr lvl="1"/>
             <a:r>
               <a:rPr lang="en-US" dirty="0" smtClean="0"/>
-              <a:t>NuGet </a:t>
-            </a:r>
-            <a:r>
-              <a:rPr lang="en-US" dirty="0" smtClean="0"/>
-              <a:t>?</a:t>
+              <a:t>NuGet ?</a:t>
             </a:r>
           </a:p>
           <a:p>
@@ -6242,7 +6708,6 @@
               <a:rPr lang="en-US" dirty="0" smtClean="0"/>
               <a:t>Rx ?</a:t>
             </a:r>
-            <a:endParaRPr lang="en-US" dirty="0" smtClean="0"/>
           </a:p>
         </p:txBody>
       </p:sp>
@@ -6345,8 +6810,12 @@
           <a:lstStyle/>
           <a:p>
             <a:r>
-              <a:rPr lang="nl-NL" smtClean="0"/>
-              <a:t>Aaron D. Hoffman, Hoffman Consulting</a:t>
+              <a:rPr lang="nl-NL" dirty="0" smtClean="0"/>
+              <a:t>Aaron D. Hoffman, </a:t>
+            </a:r>
+            <a:r>
+              <a:rPr lang="nl-NL" dirty="0" smtClean="0"/>
+              <a:t>StoneFinch Consulting</a:t>
             </a:r>
             <a:endParaRPr lang="en-US" dirty="0"/>
           </a:p>
@@ -6543,8 +7012,12 @@
           <a:lstStyle/>
           <a:p>
             <a:r>
-              <a:rPr lang="nl-NL" smtClean="0"/>
-              <a:t>Aaron D. Hoffman, Hoffman Consulting</a:t>
+              <a:rPr lang="nl-NL" dirty="0" smtClean="0"/>
+              <a:t>Aaron D. Hoffman, </a:t>
+            </a:r>
+            <a:r>
+              <a:rPr lang="nl-NL" dirty="0" smtClean="0"/>
+              <a:t>StoneFinch Consulting</a:t>
             </a:r>
             <a:endParaRPr lang="en-US" dirty="0"/>
           </a:p>
@@ -6751,8 +7224,12 @@
           <a:lstStyle/>
           <a:p>
             <a:r>
-              <a:rPr lang="nl-NL" smtClean="0"/>
-              <a:t>Aaron D. Hoffman, Hoffman Consulting</a:t>
+              <a:rPr lang="nl-NL" dirty="0" smtClean="0"/>
+              <a:t>Aaron D. Hoffman, </a:t>
+            </a:r>
+            <a:r>
+              <a:rPr lang="nl-NL" dirty="0" smtClean="0"/>
+              <a:t>StoneFinch Consulting</a:t>
             </a:r>
             <a:endParaRPr lang="en-US" dirty="0"/>
           </a:p>
@@ -6973,8 +7450,12 @@
           <a:lstStyle/>
           <a:p>
             <a:r>
-              <a:rPr lang="nl-NL" smtClean="0"/>
-              <a:t>Aaron D. Hoffman, Hoffman Consulting</a:t>
+              <a:rPr lang="nl-NL" dirty="0" smtClean="0"/>
+              <a:t>Aaron D. Hoffman, </a:t>
+            </a:r>
+            <a:r>
+              <a:rPr lang="nl-NL" dirty="0" smtClean="0"/>
+              <a:t>StoneFinch Consulting</a:t>
             </a:r>
             <a:endParaRPr lang="en-US" dirty="0"/>
           </a:p>
@@ -7288,8 +7769,12 @@
           <a:lstStyle/>
           <a:p>
             <a:r>
-              <a:rPr lang="nl-NL" smtClean="0"/>
-              <a:t>Aaron D. Hoffman, Hoffman Consulting</a:t>
+              <a:rPr lang="nl-NL" dirty="0" smtClean="0"/>
+              <a:t>Aaron D. Hoffman, </a:t>
+            </a:r>
+            <a:r>
+              <a:rPr lang="nl-NL" dirty="0" smtClean="0"/>
+              <a:t>StoneFinch Consulting</a:t>
             </a:r>
             <a:endParaRPr lang="en-US" dirty="0"/>
           </a:p>
@@ -7330,197 +7815,122 @@
         </p:nvSpPr>
         <p:spPr/>
         <p:txBody>
-          <a:bodyPr/>
-          <a:lstStyle/>
-          <a:p>
-            <a:endParaRPr lang="en-US" dirty="0" smtClean="0"/>
-          </a:p>
-          <a:p>
-            <a:pPr marL="274320" lvl="1" indent="0">
+          <a:bodyPr>
+            <a:noAutofit/>
+          </a:bodyPr>
+          <a:lstStyle/>
+          <a:p>
+            <a:pPr marL="0" indent="0">
               <a:buNone/>
             </a:pPr>
             <a:r>
-              <a:rPr lang="en-US" dirty="0" smtClean="0"/>
-              <a:t>Reactive </a:t>
-            </a:r>
-            <a:r>
-              <a:rPr lang="en-US" dirty="0"/>
-              <a:t>Extensions (Rx) is a library for </a:t>
-            </a:r>
-            <a:r>
-              <a:rPr lang="en-US" u="sng" dirty="0"/>
-              <a:t>composing</a:t>
-            </a:r>
-            <a:r>
-              <a:rPr lang="en-US" dirty="0"/>
-              <a:t> asynchronous and event-based programs </a:t>
-            </a:r>
-            <a:r>
-              <a:rPr lang="en-US" dirty="0" smtClean="0"/>
-              <a:t>using</a:t>
-            </a:r>
-          </a:p>
-          <a:p>
-            <a:pPr marL="274320" lvl="1" indent="0">
+              <a:rPr lang="en-US" sz="2400" dirty="0" smtClean="0"/>
+              <a:t>Rx makes you think about Reactive Programs in a new way…</a:t>
+            </a:r>
+            <a:endParaRPr lang="en-US" sz="2400" dirty="0" smtClean="0"/>
+          </a:p>
+          <a:p>
+            <a:pPr marL="0" indent="0">
               <a:buNone/>
             </a:pPr>
             <a:r>
-              <a:rPr lang="en-US" u="sng" dirty="0" smtClean="0"/>
-              <a:t>observable</a:t>
-            </a:r>
-            <a:r>
-              <a:rPr lang="en-US" b="1" i="1" u="sng" dirty="0" smtClean="0"/>
-              <a:t> </a:t>
-            </a:r>
-            <a:r>
-              <a:rPr lang="en-US" u="sng" dirty="0"/>
-              <a:t>sequences</a:t>
-            </a:r>
-            <a:r>
-              <a:rPr lang="en-US" b="1" i="1" dirty="0"/>
-              <a:t> </a:t>
-            </a:r>
-            <a:r>
-              <a:rPr lang="en-US" dirty="0"/>
-              <a:t>and LINQ-style query </a:t>
-            </a:r>
-            <a:r>
-              <a:rPr lang="en-US" dirty="0" smtClean="0"/>
-              <a:t>operators.</a:t>
-            </a:r>
-          </a:p>
-          <a:p>
-            <a:pPr marL="274320" lvl="1" indent="0">
+              <a:rPr lang="en-US" sz="2400" dirty="0" smtClean="0"/>
+              <a:t>“Asynchronous Dat</a:t>
+            </a:r>
+            <a:r>
+              <a:rPr lang="en-US" sz="2400" dirty="0" smtClean="0"/>
+              <a:t>a Streams”</a:t>
+            </a:r>
+          </a:p>
+          <a:p>
+            <a:pPr marL="0" indent="0">
               <a:buNone/>
             </a:pPr>
-            <a:endParaRPr lang="en-US" dirty="0"/>
-          </a:p>
-          <a:p>
-            <a:pPr marL="731520" lvl="1" indent="-457200">
-              <a:buAutoNum type="arabicPeriod"/>
-            </a:pPr>
-            <a:r>
-              <a:rPr lang="en-US" sz="2000" b="1" i="1" dirty="0" smtClean="0"/>
-              <a:t>Represent</a:t>
-            </a:r>
-            <a:r>
-              <a:rPr lang="en-US" sz="2000" i="1" dirty="0" smtClean="0"/>
-              <a:t> </a:t>
-            </a:r>
-            <a:r>
-              <a:rPr lang="en-US" sz="2000" dirty="0"/>
-              <a:t>asynchronous data streams </a:t>
-            </a:r>
-            <a:r>
-              <a:rPr lang="en-US" sz="2000" dirty="0" smtClean="0"/>
-              <a:t>with </a:t>
-            </a:r>
-            <a:r>
-              <a:rPr lang="en-US" sz="2000" b="1" i="1" dirty="0" smtClean="0"/>
-              <a:t>Observables</a:t>
-            </a:r>
-            <a:r>
-              <a:rPr lang="en-US" sz="2000" dirty="0" smtClean="0"/>
-              <a:t>.</a:t>
-            </a:r>
-          </a:p>
-          <a:p>
-            <a:pPr marL="731520" lvl="1" indent="-457200">
-              <a:buAutoNum type="arabicPeriod"/>
-            </a:pPr>
-            <a:r>
-              <a:rPr lang="en-US" sz="2000" b="1" i="1" dirty="0" smtClean="0"/>
-              <a:t>Query</a:t>
-            </a:r>
-            <a:r>
-              <a:rPr lang="en-US" sz="2000" dirty="0" smtClean="0"/>
-              <a:t> </a:t>
-            </a:r>
-            <a:r>
-              <a:rPr lang="en-US" sz="2000" dirty="0"/>
-              <a:t>asynchronous data streams </a:t>
-            </a:r>
-            <a:r>
-              <a:rPr lang="en-US" sz="2000" dirty="0" smtClean="0"/>
-              <a:t>using </a:t>
-            </a:r>
-            <a:r>
-              <a:rPr lang="en-US" sz="2000" b="1" i="1" dirty="0" smtClean="0"/>
-              <a:t>LINQ</a:t>
-            </a:r>
-            <a:r>
-              <a:rPr lang="en-US" sz="2000" dirty="0" smtClean="0"/>
-              <a:t> operators.</a:t>
-            </a:r>
-          </a:p>
-          <a:p>
-            <a:pPr marL="731520" lvl="1" indent="-457200">
-              <a:buAutoNum type="arabicPeriod"/>
-            </a:pPr>
-            <a:r>
-              <a:rPr lang="en-US" sz="2000" b="1" i="1" dirty="0" smtClean="0"/>
-              <a:t>Parameterize</a:t>
-            </a:r>
-            <a:r>
-              <a:rPr lang="en-US" sz="2000" dirty="0" smtClean="0"/>
-              <a:t> </a:t>
-            </a:r>
-            <a:r>
-              <a:rPr lang="en-US" sz="2000" dirty="0"/>
-              <a:t>the concurrency in the asynchronous data streams </a:t>
-            </a:r>
-            <a:r>
-              <a:rPr lang="en-US" sz="2000" dirty="0" smtClean="0"/>
-              <a:t>using </a:t>
-            </a:r>
-            <a:r>
-              <a:rPr lang="en-US" sz="2000" b="1" i="1" dirty="0" smtClean="0"/>
-              <a:t>Schedulers</a:t>
-            </a:r>
-            <a:r>
-              <a:rPr lang="en-US" sz="2000" dirty="0" smtClean="0"/>
-              <a:t>.</a:t>
-            </a:r>
-          </a:p>
-          <a:p>
-            <a:pPr marL="731520" lvl="1" indent="-457200">
-              <a:buAutoNum type="arabicPeriod"/>
-            </a:pPr>
-            <a:endParaRPr lang="en-US" sz="2000" dirty="0"/>
-          </a:p>
-          <a:p>
-            <a:pPr marL="274320" lvl="1" indent="0">
+            <a:endParaRPr lang="en-US" sz="2400" dirty="0" smtClean="0"/>
+          </a:p>
+          <a:p>
+            <a:pPr marL="0" indent="0">
               <a:buNone/>
             </a:pPr>
-            <a:endParaRPr lang="en-US" sz="2000" dirty="0" smtClean="0"/>
-          </a:p>
-          <a:p>
-            <a:pPr marL="274320" lvl="1" indent="0">
+            <a:r>
+              <a:rPr lang="en-US" sz="2400" dirty="0" smtClean="0"/>
+              <a:t>Let’s take the Button Click event as an example</a:t>
+            </a:r>
+          </a:p>
+          <a:p>
+            <a:pPr marL="0" indent="0">
               <a:buNone/>
             </a:pPr>
-            <a:r>
-              <a:rPr lang="en-US" sz="2000" dirty="0"/>
-              <a:t>	</a:t>
-            </a:r>
-            <a:r>
-              <a:rPr lang="en-US" sz="2000" dirty="0" smtClean="0"/>
-              <a:t>      </a:t>
-            </a:r>
-            <a:r>
-              <a:rPr lang="en-US" dirty="0" smtClean="0"/>
-              <a:t>Rx </a:t>
-            </a:r>
-            <a:r>
-              <a:rPr lang="en-US" dirty="0"/>
-              <a:t>= Observables + LINQ + </a:t>
-            </a:r>
-            <a:r>
-              <a:rPr lang="en-US" dirty="0" smtClean="0"/>
-              <a:t>Schedulers</a:t>
-            </a:r>
-          </a:p>
-          <a:p>
-            <a:endParaRPr lang="en-US" dirty="0"/>
+            <a:endParaRPr lang="en-US" sz="2400" dirty="0" smtClean="0"/>
+          </a:p>
+          <a:p>
+            <a:pPr marL="0" indent="0">
+              <a:buNone/>
+            </a:pPr>
+            <a:r>
+              <a:rPr lang="en-US" sz="2400" dirty="0" smtClean="0"/>
+              <a:t>Can this….</a:t>
+            </a:r>
+            <a:endParaRPr lang="en-US" sz="2400" dirty="0"/>
+          </a:p>
+          <a:p>
+            <a:pPr marL="0" indent="0">
+              <a:buNone/>
+            </a:pPr>
+            <a:r>
+              <a:rPr lang="en-US" sz="2400" dirty="0" smtClean="0"/>
+              <a:t>0 - - 1 - - - 2 - - - 3 - - - - - - - - 4 - 5 - - - - - - - - 0</a:t>
+            </a:r>
+          </a:p>
+          <a:p>
+            <a:pPr marL="0" indent="0">
+              <a:buNone/>
+            </a:pPr>
+            <a:endParaRPr lang="en-US" sz="2400" dirty="0" smtClean="0"/>
+          </a:p>
+          <a:p>
+            <a:pPr marL="0" indent="0">
+              <a:buNone/>
+            </a:pPr>
+            <a:r>
+              <a:rPr lang="en-US" sz="2400" dirty="0" smtClean="0"/>
+              <a:t>Be represented like this?</a:t>
+            </a:r>
+            <a:endParaRPr lang="en-US" sz="2400" dirty="0"/>
+          </a:p>
+          <a:p>
+            <a:pPr marL="0" indent="0">
+              <a:buNone/>
+            </a:pPr>
+            <a:r>
+              <a:rPr lang="en-US" sz="2400" dirty="0" smtClean="0"/>
+              <a:t> [    1,    </a:t>
+            </a:r>
+            <a:r>
+              <a:rPr lang="en-US" sz="2400" dirty="0"/>
+              <a:t>2</a:t>
+            </a:r>
+            <a:r>
+              <a:rPr lang="en-US" sz="2400" dirty="0" smtClean="0"/>
+              <a:t>,    </a:t>
+            </a:r>
+            <a:r>
+              <a:rPr lang="en-US" sz="2400" dirty="0"/>
+              <a:t>3</a:t>
+            </a:r>
+            <a:r>
+              <a:rPr lang="en-US" sz="2400" dirty="0" smtClean="0"/>
+              <a:t>,    </a:t>
+            </a:r>
+            <a:r>
+              <a:rPr lang="en-US" sz="2400" dirty="0"/>
+              <a:t>4</a:t>
+            </a:r>
+            <a:r>
+              <a:rPr lang="en-US" sz="2400" dirty="0" smtClean="0"/>
+              <a:t>,    5    ]</a:t>
+            </a:r>
+            <a:endParaRPr lang="en-US" sz="2400" dirty="0"/>
           </a:p>
         </p:txBody>
       </p:sp>
@@ -7554,7 +7964,7 @@
     </p:spTree>
     <p:extLst>
       <p:ext uri="{BB962C8B-B14F-4D97-AF65-F5344CB8AC3E}">
-        <p14:creationId xmlns:p14="http://schemas.microsoft.com/office/powerpoint/2010/main" val="1481093845"/>
+        <p14:creationId xmlns:p14="http://schemas.microsoft.com/office/powerpoint/2010/main" val="261115087"/>
       </p:ext>
     </p:extLst>
   </p:cSld>
@@ -7629,8 +8039,12 @@
           <a:lstStyle/>
           <a:p>
             <a:r>
-              <a:rPr lang="nl-NL" smtClean="0"/>
-              <a:t>Aaron D. Hoffman, Hoffman Consulting</a:t>
+              <a:rPr lang="nl-NL" dirty="0" smtClean="0"/>
+              <a:t>Aaron D. Hoffman, </a:t>
+            </a:r>
+            <a:r>
+              <a:rPr lang="nl-NL" dirty="0" smtClean="0"/>
+              <a:t>StoneFinch Consulting</a:t>
             </a:r>
             <a:endParaRPr lang="en-US" dirty="0"/>
           </a:p>
@@ -7674,73 +8088,7 @@
           <a:bodyPr/>
           <a:lstStyle/>
           <a:p>
-            <a:r>
-              <a:rPr lang="en-US" dirty="0" smtClean="0"/>
-              <a:t>Backbone of Rx is </a:t>
-            </a:r>
-            <a:r>
-              <a:rPr lang="en-US" b="1" dirty="0" smtClean="0"/>
-              <a:t>Observable</a:t>
-            </a:r>
-          </a:p>
-          <a:p>
-            <a:pPr lvl="1"/>
-            <a:r>
-              <a:rPr lang="en-US" dirty="0" smtClean="0"/>
-              <a:t>Not “ObservableCollection”</a:t>
-            </a:r>
-            <a:endParaRPr lang="en-US" dirty="0"/>
-          </a:p>
-          <a:p>
-            <a:pPr lvl="1"/>
-            <a:r>
-              <a:rPr lang="en-US" dirty="0" smtClean="0"/>
-              <a:t>Almost </a:t>
-            </a:r>
-            <a:r>
-              <a:rPr lang="en-US" dirty="0" smtClean="0"/>
-              <a:t>all data can be expressed in this </a:t>
-            </a:r>
-            <a:r>
-              <a:rPr lang="en-US" dirty="0" smtClean="0"/>
-              <a:t>way</a:t>
-            </a:r>
             <a:endParaRPr lang="en-US" dirty="0" smtClean="0"/>
-          </a:p>
-          <a:p>
-            <a:pPr lvl="1"/>
-            <a:r>
-              <a:rPr lang="en-US" dirty="0" smtClean="0"/>
-              <a:t>Async Dat</a:t>
-            </a:r>
-            <a:r>
-              <a:rPr lang="en-US" dirty="0" smtClean="0"/>
-              <a:t>a Stream = </a:t>
-            </a:r>
-            <a:r>
-              <a:rPr lang="en-US" dirty="0" smtClean="0"/>
-              <a:t>“Future </a:t>
-            </a:r>
-            <a:r>
-              <a:rPr lang="en-US" dirty="0" smtClean="0"/>
-              <a:t>Collection</a:t>
-            </a:r>
-            <a:r>
-              <a:rPr lang="en-US" dirty="0" smtClean="0"/>
-              <a:t>”</a:t>
-            </a:r>
-          </a:p>
-          <a:p>
-            <a:pPr lvl="1"/>
-            <a:r>
-              <a:rPr lang="en-US" dirty="0" smtClean="0"/>
-              <a:t>Understanding Observable is essential to Rx</a:t>
-            </a:r>
-            <a:endParaRPr lang="en-US" dirty="0" smtClean="0"/>
-          </a:p>
-          <a:p>
-            <a:pPr lvl="1"/>
-            <a:endParaRPr lang="en-US" dirty="0"/>
           </a:p>
           <a:p>
             <a:pPr marL="274320" lvl="1" indent="0">
@@ -7748,8 +8096,193 @@
             </a:pPr>
             <a:r>
               <a:rPr lang="en-US" dirty="0" smtClean="0"/>
-              <a:t>  Data Source	     Observable	    Action</a:t>
-            </a:r>
+              <a:t>Reactive </a:t>
+            </a:r>
+            <a:r>
+              <a:rPr lang="en-US" dirty="0"/>
+              <a:t>Extensions (Rx) is a library for </a:t>
+            </a:r>
+            <a:r>
+              <a:rPr lang="en-US" u="sng" dirty="0"/>
+              <a:t>composing</a:t>
+            </a:r>
+            <a:r>
+              <a:rPr lang="en-US" dirty="0"/>
+              <a:t> asynchronous and event-based programs </a:t>
+            </a:r>
+            <a:r>
+              <a:rPr lang="en-US" dirty="0" smtClean="0"/>
+              <a:t>using</a:t>
+            </a:r>
+          </a:p>
+          <a:p>
+            <a:pPr marL="274320" lvl="1" indent="0">
+              <a:buNone/>
+            </a:pPr>
+            <a:r>
+              <a:rPr lang="en-US" u="sng" dirty="0" smtClean="0"/>
+              <a:t>observable</a:t>
+            </a:r>
+            <a:r>
+              <a:rPr lang="en-US" b="1" i="1" u="sng" dirty="0" smtClean="0"/>
+              <a:t> </a:t>
+            </a:r>
+            <a:r>
+              <a:rPr lang="en-US" u="sng" dirty="0"/>
+              <a:t>sequences</a:t>
+            </a:r>
+            <a:r>
+              <a:rPr lang="en-US" b="1" i="1" dirty="0"/>
+              <a:t> </a:t>
+            </a:r>
+            <a:r>
+              <a:rPr lang="en-US" dirty="0"/>
+              <a:t>and LINQ-style query </a:t>
+            </a:r>
+            <a:r>
+              <a:rPr lang="en-US" dirty="0" smtClean="0"/>
+              <a:t>operators.</a:t>
+            </a:r>
+          </a:p>
+          <a:p>
+            <a:pPr marL="274320" lvl="1" indent="0">
+              <a:buNone/>
+            </a:pPr>
+            <a:endParaRPr lang="en-US" dirty="0"/>
+          </a:p>
+          <a:p>
+            <a:pPr marL="731520" lvl="1" indent="-457200">
+              <a:buAutoNum type="arabicPeriod"/>
+            </a:pPr>
+            <a:r>
+              <a:rPr lang="en-US" sz="2000" b="1" i="1" dirty="0" smtClean="0"/>
+              <a:t>Represent</a:t>
+            </a:r>
+            <a:r>
+              <a:rPr lang="en-US" sz="2000" i="1" dirty="0" smtClean="0"/>
+              <a:t> </a:t>
+            </a:r>
+            <a:r>
+              <a:rPr lang="en-US" sz="2000" dirty="0"/>
+              <a:t>asynchronous data streams </a:t>
+            </a:r>
+            <a:r>
+              <a:rPr lang="en-US" sz="2000" dirty="0" smtClean="0"/>
+              <a:t>with </a:t>
+            </a:r>
+            <a:r>
+              <a:rPr lang="en-US" sz="2000" b="1" i="1" dirty="0" smtClean="0"/>
+              <a:t>Observables</a:t>
+            </a:r>
+            <a:r>
+              <a:rPr lang="en-US" sz="2000" dirty="0" smtClean="0"/>
+              <a:t>.</a:t>
+            </a:r>
+          </a:p>
+          <a:p>
+            <a:pPr marL="731520" lvl="1" indent="-457200">
+              <a:buAutoNum type="arabicPeriod"/>
+            </a:pPr>
+            <a:r>
+              <a:rPr lang="en-US" sz="2000" b="1" i="1" dirty="0" smtClean="0"/>
+              <a:t>Query</a:t>
+            </a:r>
+            <a:r>
+              <a:rPr lang="en-US" sz="2000" dirty="0" smtClean="0"/>
+              <a:t> </a:t>
+            </a:r>
+            <a:r>
+              <a:rPr lang="en-US" sz="2000" dirty="0"/>
+              <a:t>asynchronous data streams </a:t>
+            </a:r>
+            <a:r>
+              <a:rPr lang="en-US" sz="2000" dirty="0" smtClean="0"/>
+              <a:t>using </a:t>
+            </a:r>
+            <a:r>
+              <a:rPr lang="en-US" sz="2000" b="1" i="1" dirty="0" smtClean="0"/>
+              <a:t>LINQ</a:t>
+            </a:r>
+            <a:r>
+              <a:rPr lang="en-US" sz="2000" dirty="0" smtClean="0"/>
+              <a:t> operators.</a:t>
+            </a:r>
+          </a:p>
+          <a:p>
+            <a:pPr marL="731520" lvl="1" indent="-457200">
+              <a:buAutoNum type="arabicPeriod"/>
+            </a:pPr>
+            <a:r>
+              <a:rPr lang="en-US" sz="2000" b="1" i="1" dirty="0" smtClean="0"/>
+              <a:t>Parameterize</a:t>
+            </a:r>
+            <a:r>
+              <a:rPr lang="en-US" sz="2000" dirty="0" smtClean="0"/>
+              <a:t> </a:t>
+            </a:r>
+            <a:r>
+              <a:rPr lang="en-US" sz="2000" dirty="0"/>
+              <a:t>the concurrency </a:t>
+            </a:r>
+            <a:r>
+              <a:rPr lang="en-US" sz="2000" dirty="0" smtClean="0"/>
+              <a:t>of </a:t>
+            </a:r>
+            <a:r>
+              <a:rPr lang="en-US" sz="2000" dirty="0"/>
+              <a:t>the asynchronous data streams </a:t>
+            </a:r>
+            <a:r>
+              <a:rPr lang="en-US" sz="2000" dirty="0" smtClean="0"/>
+              <a:t>using </a:t>
+            </a:r>
+            <a:r>
+              <a:rPr lang="en-US" sz="2000" b="1" i="1" dirty="0" smtClean="0"/>
+              <a:t>Schedulers</a:t>
+            </a:r>
+            <a:r>
+              <a:rPr lang="en-US" sz="2000" dirty="0" smtClean="0"/>
+              <a:t>.</a:t>
+            </a:r>
+          </a:p>
+          <a:p>
+            <a:pPr marL="731520" lvl="1" indent="-457200">
+              <a:buAutoNum type="arabicPeriod"/>
+            </a:pPr>
+            <a:endParaRPr lang="en-US" sz="2000" dirty="0"/>
+          </a:p>
+          <a:p>
+            <a:pPr marL="274320" lvl="1" indent="0">
+              <a:buNone/>
+            </a:pPr>
+            <a:endParaRPr lang="en-US" sz="2000" dirty="0" smtClean="0"/>
+          </a:p>
+          <a:p>
+            <a:pPr marL="274320" lvl="1" indent="0">
+              <a:buNone/>
+            </a:pPr>
+            <a:r>
+              <a:rPr lang="en-US" sz="2000" dirty="0"/>
+              <a:t>	</a:t>
+            </a:r>
+            <a:r>
+              <a:rPr lang="en-US" sz="2000" dirty="0" smtClean="0"/>
+              <a:t>      </a:t>
+            </a:r>
+            <a:r>
+              <a:rPr lang="en-US" dirty="0" smtClean="0"/>
+              <a:t>Rx </a:t>
+            </a:r>
+            <a:r>
+              <a:rPr lang="en-US" dirty="0"/>
+              <a:t>= Observables + LINQ + </a:t>
+            </a:r>
+            <a:r>
+              <a:rPr lang="en-US" dirty="0" smtClean="0"/>
+              <a:t>Schedulers</a:t>
+            </a:r>
+          </a:p>
+          <a:p>
             <a:endParaRPr lang="en-US" dirty="0"/>
           </a:p>
         </p:txBody>
@@ -7778,183 +8311,13 @@
               <a:t>)</a:t>
             </a:r>
             <a:endParaRPr lang="en-US" dirty="0"/>
-          </a:p>
-        </p:txBody>
-      </p:sp>
-      <p:sp>
-        <p:nvSpPr>
-          <p:cNvPr id="7" name="Can 6"/>
-          <p:cNvSpPr/>
-          <p:nvPr/>
-        </p:nvSpPr>
-        <p:spPr>
-          <a:xfrm>
-            <a:off x="1219200" y="4267200"/>
-            <a:ext cx="990600" cy="1143000"/>
-          </a:xfrm>
-          <a:prstGeom prst="can">
-            <a:avLst/>
-          </a:prstGeom>
-        </p:spPr>
-        <p:style>
-          <a:lnRef idx="2">
-            <a:schemeClr val="accent1">
-              <a:shade val="50000"/>
-            </a:schemeClr>
-          </a:lnRef>
-          <a:fillRef idx="1">
-            <a:schemeClr val="accent1"/>
-          </a:fillRef>
-          <a:effectRef idx="0">
-            <a:schemeClr val="accent1"/>
-          </a:effectRef>
-          <a:fontRef idx="minor">
-            <a:schemeClr val="lt1"/>
-          </a:fontRef>
-        </p:style>
-        <p:txBody>
-          <a:bodyPr rtlCol="0" anchor="ctr"/>
-          <a:lstStyle/>
-          <a:p>
-            <a:pPr algn="ctr"/>
-            <a:endParaRPr lang="en-US"/>
-          </a:p>
-        </p:txBody>
-      </p:sp>
-      <p:sp>
-        <p:nvSpPr>
-          <p:cNvPr id="8" name="TextBox 7"/>
-          <p:cNvSpPr txBox="1"/>
-          <p:nvPr/>
-        </p:nvSpPr>
-        <p:spPr>
-          <a:xfrm>
-            <a:off x="3581400" y="4053870"/>
-            <a:ext cx="1676400" cy="1569660"/>
-          </a:xfrm>
-          <a:prstGeom prst="rect">
-            <a:avLst/>
-          </a:prstGeom>
-          <a:noFill/>
-        </p:spPr>
-        <p:txBody>
-          <a:bodyPr wrap="square" rtlCol="0">
-            <a:spAutoFit/>
-          </a:bodyPr>
-          <a:lstStyle/>
-          <a:p>
-            <a:r>
-              <a:rPr lang="en-US" sz="9600" dirty="0" smtClean="0"/>
-              <a:t>Rx</a:t>
-            </a:r>
-            <a:endParaRPr lang="en-US" sz="9600" dirty="0"/>
-          </a:p>
-        </p:txBody>
-      </p:sp>
-      <p:sp>
-        <p:nvSpPr>
-          <p:cNvPr id="9" name="TextBox 8"/>
-          <p:cNvSpPr txBox="1"/>
-          <p:nvPr/>
-        </p:nvSpPr>
-        <p:spPr>
-          <a:xfrm>
-            <a:off x="1447800" y="4217243"/>
-            <a:ext cx="1676400" cy="1446550"/>
-          </a:xfrm>
-          <a:prstGeom prst="rect">
-            <a:avLst/>
-          </a:prstGeom>
-          <a:noFill/>
-        </p:spPr>
-        <p:txBody>
-          <a:bodyPr wrap="square" rtlCol="0">
-            <a:spAutoFit/>
-          </a:bodyPr>
-          <a:lstStyle/>
-          <a:p>
-            <a:r>
-              <a:rPr lang="en-US" sz="8800" dirty="0" smtClean="0"/>
-              <a:t>?</a:t>
-            </a:r>
-            <a:endParaRPr lang="en-US" sz="8800" dirty="0"/>
-          </a:p>
-        </p:txBody>
-      </p:sp>
-      <p:sp>
-        <p:nvSpPr>
-          <p:cNvPr id="10" name="Lightning Bolt 9"/>
-          <p:cNvSpPr/>
-          <p:nvPr/>
-        </p:nvSpPr>
-        <p:spPr>
-          <a:xfrm>
-            <a:off x="6377940" y="4369018"/>
-            <a:ext cx="1219200" cy="1143000"/>
-          </a:xfrm>
-          <a:prstGeom prst="lightningBolt">
-            <a:avLst/>
-          </a:prstGeom>
-        </p:spPr>
-        <p:style>
-          <a:lnRef idx="2">
-            <a:schemeClr val="accent1">
-              <a:shade val="50000"/>
-            </a:schemeClr>
-          </a:lnRef>
-          <a:fillRef idx="1">
-            <a:schemeClr val="accent1"/>
-          </a:fillRef>
-          <a:effectRef idx="0">
-            <a:schemeClr val="accent1"/>
-          </a:effectRef>
-          <a:fontRef idx="minor">
-            <a:schemeClr val="lt1"/>
-          </a:fontRef>
-        </p:style>
-        <p:txBody>
-          <a:bodyPr rtlCol="0" anchor="ctr"/>
-          <a:lstStyle/>
-          <a:p>
-            <a:pPr algn="ctr"/>
-            <a:endParaRPr lang="en-US"/>
-          </a:p>
-        </p:txBody>
-      </p:sp>
-      <p:sp>
-        <p:nvSpPr>
-          <p:cNvPr id="11" name="TextBox 10"/>
-          <p:cNvSpPr txBox="1"/>
-          <p:nvPr/>
-        </p:nvSpPr>
-        <p:spPr>
-          <a:xfrm>
-            <a:off x="2480154" y="5638800"/>
-            <a:ext cx="4002378" cy="400110"/>
-          </a:xfrm>
-          <a:prstGeom prst="rect">
-            <a:avLst/>
-          </a:prstGeom>
-          <a:noFill/>
-        </p:spPr>
-        <p:txBody>
-          <a:bodyPr wrap="none" rtlCol="0">
-            <a:spAutoFit/>
-          </a:bodyPr>
-          <a:lstStyle/>
-          <a:p>
-            <a:r>
-              <a:rPr lang="en-US" sz="2000" i="1" dirty="0" smtClean="0"/>
-              <a:t>Standardize the “glue” (similar to LINQ)</a:t>
-            </a:r>
-            <a:endParaRPr lang="en-US" sz="2000" i="1" dirty="0"/>
           </a:p>
         </p:txBody>
       </p:sp>
     </p:spTree>
     <p:extLst>
       <p:ext uri="{BB962C8B-B14F-4D97-AF65-F5344CB8AC3E}">
-        <p14:creationId xmlns:p14="http://schemas.microsoft.com/office/powerpoint/2010/main" val="3527076642"/>
+        <p14:creationId xmlns:p14="http://schemas.microsoft.com/office/powerpoint/2010/main" val="1481093845"/>
       </p:ext>
     </p:extLst>
   </p:cSld>

</xml_diff>